<commit_message>
Update matrixAlgebraSlides for markov tutorials.pptx
</commit_message>
<xml_diff>
--- a/static/Course_Modularization/Intro, general, packages/matrixAlgebraSlides for markov tutorials.pptx
+++ b/static/Course_Modularization/Intro, general, packages/matrixAlgebraSlides for markov tutorials.pptx
@@ -219,7 +219,7 @@
           <a:p>
             <a:fld id="{80022054-F6B9-B04E-9F80-BE6C2BED9348}" type="datetimeFigureOut">
               <a:rPr lang="en-US" smtClean="0"/>
-              <a:t>2/1/22</a:t>
+              <a:t>2/8/22</a:t>
             </a:fld>
             <a:endParaRPr lang="en-US"/>
           </a:p>
@@ -1325,7 +1325,7 @@
           <a:p>
             <a:fld id="{BDF69A25-FC8F-1E41-82C3-60BB70D84ECC}" type="datetime1">
               <a:rPr lang="en-US" smtClean="0"/>
-              <a:t>2/1/22</a:t>
+              <a:t>2/8/22</a:t>
             </a:fld>
             <a:endParaRPr lang="en-US"/>
           </a:p>
@@ -1663,7 +1663,7 @@
           <a:p>
             <a:fld id="{6482A86D-E224-D84F-9B4E-CB4DACBEC078}" type="datetime1">
               <a:rPr lang="en-US" smtClean="0"/>
-              <a:t>2/1/22</a:t>
+              <a:t>2/8/22</a:t>
             </a:fld>
             <a:endParaRPr lang="en-US"/>
           </a:p>
@@ -1852,7 +1852,7 @@
           <a:p>
             <a:fld id="{E9372DA5-F28C-3542-97D3-021892493D10}" type="datetime1">
               <a:rPr lang="en-US" smtClean="0"/>
-              <a:t>2/1/22</a:t>
+              <a:t>2/8/22</a:t>
             </a:fld>
             <a:endParaRPr lang="en-US"/>
           </a:p>
@@ -2047,7 +2047,7 @@
           <a:p>
             <a:fld id="{D221F1C0-035C-3B41-B152-F242649CBAA9}" type="datetime1">
               <a:rPr lang="en-US" smtClean="0"/>
-              <a:t>2/1/22</a:t>
+              <a:t>2/8/22</a:t>
             </a:fld>
             <a:endParaRPr lang="en-US"/>
           </a:p>
@@ -2204,7 +2204,7 @@
           <a:p>
             <a:fld id="{FB911320-3942-1145-A62F-28CB5FDC7165}" type="datetime1">
               <a:rPr lang="en-US" smtClean="0"/>
-              <a:t>2/1/22</a:t>
+              <a:t>2/8/22</a:t>
             </a:fld>
             <a:endParaRPr lang="en-US"/>
           </a:p>
@@ -2484,7 +2484,7 @@
           <a:p>
             <a:fld id="{FC67E3EE-F8E1-A945-96B0-1B62DE885EEB}" type="datetime1">
               <a:rPr lang="en-US" smtClean="0"/>
-              <a:t>2/1/22</a:t>
+              <a:t>2/8/22</a:t>
             </a:fld>
             <a:endParaRPr lang="en-US"/>
           </a:p>
@@ -3429,7 +3429,7 @@
           <a:p>
             <a:fld id="{7861943E-DB49-C74B-90D3-3B219F0F58BF}" type="datetime1">
               <a:rPr lang="en-US" smtClean="0"/>
-              <a:t>2/1/22</a:t>
+              <a:t>2/8/22</a:t>
             </a:fld>
             <a:endParaRPr lang="en-US"/>
           </a:p>
@@ -3467,7 +3467,7 @@
           <a:noFill/>
           <a:extLst>
             <a:ext uri="{909E8E84-426E-40dd-AFC4-6F175D3DCCD1}">
-              <a14:hiddenFill xmlns:a14="http://schemas.microsoft.com/office/drawing/2010/main" xmlns="">
+              <a14:hiddenFill xmlns="" xmlns:a14="http://schemas.microsoft.com/office/drawing/2010/main">
                 <a:solidFill>
                   <a:srgbClr val="FFFFFF"/>
                 </a:solidFill>
@@ -3508,7 +3508,7 @@
           <a:noFill/>
           <a:extLst>
             <a:ext uri="{909E8E84-426E-40dd-AFC4-6F175D3DCCD1}">
-              <a14:hiddenFill xmlns:a14="http://schemas.microsoft.com/office/drawing/2010/main" xmlns="">
+              <a14:hiddenFill xmlns="" xmlns:a14="http://schemas.microsoft.com/office/drawing/2010/main">
                 <a:solidFill>
                   <a:srgbClr val="FFFFFF"/>
                 </a:solidFill>
@@ -4380,7 +4380,7 @@
           <p:nvPr>
             <p:extLst>
               <p:ext uri="{D42A27DB-BD31-4B8C-83A1-F6EECF244321}">
-                <p14:modId xmlns:p14="http://schemas.microsoft.com/office/powerpoint/2010/main" val="800326083"/>
+                <p14:modId xmlns:p14="http://schemas.microsoft.com/office/powerpoint/2010/main" val="91127087"/>
               </p:ext>
             </p:extLst>
           </p:nvPr>
@@ -4677,21 +4677,7 @@
                           <a:ea typeface="+mn-ea"/>
                           <a:cs typeface="+mn-cs"/>
                         </a:rPr>
-                        <a:t>1 Drug Policy Program, Center for Research and Teaching in Economics (CIDE) - CONACyT, </a:t>
-                      </a:r>
-                    </a:p>
-                    <a:p>
-                      <a:r>
-                        <a:rPr lang="en-US" sz="1200" kern="1200" dirty="0">
-                          <a:solidFill>
-                            <a:srgbClr val="FEF8F3"/>
-                          </a:solidFill>
-                          <a:effectLst/>
-                          <a:latin typeface="+mn-lt"/>
-                          <a:ea typeface="+mn-ea"/>
-                          <a:cs typeface="+mn-cs"/>
-                        </a:rPr>
-                        <a:t>  Aguascalientes, Mexico</a:t>
+                        <a:t>1 Division of Public Administration, Center for Research and Teaching in Economics (CIDE), Aguascalientes, Mexico</a:t>
                       </a:r>
                     </a:p>
                     <a:p>
@@ -4747,7 +4733,7 @@
                           <a:ea typeface="+mn-ea"/>
                           <a:cs typeface="+mn-cs"/>
                         </a:rPr>
-                        <a:t>5 University of Pittsburgh Graduate School of Public Health, Pittsburgh, PA, USA</a:t>
+                        <a:t>5 University of Ottawa, Ottawa, Canada</a:t>
                       </a:r>
                     </a:p>
                     <a:p>
@@ -4885,7 +4871,7 @@
           <a:noFill/>
           <a:extLst>
             <a:ext uri="{909E8E84-426E-40dd-AFC4-6F175D3DCCD1}">
-              <a14:hiddenFill xmlns:a14="http://schemas.microsoft.com/office/drawing/2010/main" xmlns="">
+              <a14:hiddenFill xmlns="" xmlns:a14="http://schemas.microsoft.com/office/drawing/2010/main">
                 <a:solidFill>
                   <a:srgbClr val="FFFFFF"/>
                 </a:solidFill>
@@ -4924,7 +4910,7 @@
           <a:noFill/>
           <a:extLst>
             <a:ext uri="{909E8E84-426E-40dd-AFC4-6F175D3DCCD1}">
-              <a14:hiddenFill xmlns:a14="http://schemas.microsoft.com/office/drawing/2010/main" xmlns="">
+              <a14:hiddenFill xmlns="" xmlns:a14="http://schemas.microsoft.com/office/drawing/2010/main">
                 <a:solidFill>
                   <a:srgbClr val="FFFFFF"/>
                 </a:solidFill>
@@ -5019,7 +5005,7 @@
           <a:noFill/>
           <a:extLst>
             <a:ext uri="{909E8E84-426E-40dd-AFC4-6F175D3DCCD1}">
-              <a14:hiddenFill xmlns:a14="http://schemas.microsoft.com/office/drawing/2010/main" xmlns="">
+              <a14:hiddenFill xmlns="" xmlns:a14="http://schemas.microsoft.com/office/drawing/2010/main">
                 <a:solidFill>
                   <a:srgbClr val="FFFFFF"/>
                 </a:solidFill>
@@ -5060,7 +5046,7 @@
           <a:noFill/>
           <a:extLst>
             <a:ext uri="{909E8E84-426E-40dd-AFC4-6F175D3DCCD1}">
-              <a14:hiddenFill xmlns:a14="http://schemas.microsoft.com/office/drawing/2010/main" xmlns="">
+              <a14:hiddenFill xmlns="" xmlns:a14="http://schemas.microsoft.com/office/drawing/2010/main">
                 <a:solidFill>
                   <a:srgbClr val="FFFFFF"/>
                 </a:solidFill>
@@ -5105,14 +5091,14 @@
           <a:effectLst/>
           <a:extLst>
             <a:ext uri="{909E8E84-426E-40dd-AFC4-6F175D3DCCD1}">
-              <a14:hiddenFill xmlns:a14="http://schemas.microsoft.com/office/drawing/2010/main" xmlns="">
+              <a14:hiddenFill xmlns="" xmlns:a14="http://schemas.microsoft.com/office/drawing/2010/main">
                 <a:solidFill>
                   <a:schemeClr val="accent1"/>
                 </a:solidFill>
               </a14:hiddenFill>
             </a:ext>
             <a:ext uri="{91240B29-F687-4f45-9708-019B960494DF}">
-              <a14:hiddenLine xmlns:a14="http://schemas.microsoft.com/office/drawing/2010/main" xmlns="" w="9525">
+              <a14:hiddenLine xmlns="" xmlns:a14="http://schemas.microsoft.com/office/drawing/2010/main" w="9525">
                 <a:solidFill>
                   <a:schemeClr val="tx1"/>
                 </a:solidFill>
@@ -5122,7 +5108,7 @@
               </a14:hiddenLine>
             </a:ext>
             <a:ext uri="{AF507438-7753-43e0-B8FC-AC1667EBCBE1}">
-              <a14:hiddenEffects xmlns:a14="http://schemas.microsoft.com/office/drawing/2010/main" xmlns="">
+              <a14:hiddenEffects xmlns="" xmlns:a14="http://schemas.microsoft.com/office/drawing/2010/main">
                 <a:effectLst>
                   <a:outerShdw dist="35921" dir="2700000" algn="ctr" rotWithShape="0">
                     <a:schemeClr val="bg2"/>
@@ -5169,14 +5155,14 @@
           <a:effectLst/>
           <a:extLst>
             <a:ext uri="{909E8E84-426E-40dd-AFC4-6F175D3DCCD1}">
-              <a14:hiddenFill xmlns:a14="http://schemas.microsoft.com/office/drawing/2010/main" xmlns="">
+              <a14:hiddenFill xmlns="" xmlns:a14="http://schemas.microsoft.com/office/drawing/2010/main">
                 <a:solidFill>
                   <a:schemeClr val="accent1"/>
                 </a:solidFill>
               </a14:hiddenFill>
             </a:ext>
             <a:ext uri="{91240B29-F687-4f45-9708-019B960494DF}">
-              <a14:hiddenLine xmlns:a14="http://schemas.microsoft.com/office/drawing/2010/main" xmlns="" w="9525">
+              <a14:hiddenLine xmlns="" xmlns:a14="http://schemas.microsoft.com/office/drawing/2010/main" w="9525">
                 <a:solidFill>
                   <a:schemeClr val="tx1"/>
                 </a:solidFill>
@@ -5186,7 +5172,7 @@
               </a14:hiddenLine>
             </a:ext>
             <a:ext uri="{AF507438-7753-43e0-B8FC-AC1667EBCBE1}">
-              <a14:hiddenEffects xmlns:a14="http://schemas.microsoft.com/office/drawing/2010/main" xmlns="">
+              <a14:hiddenEffects xmlns="" xmlns:a14="http://schemas.microsoft.com/office/drawing/2010/main">
                 <a:effectLst>
                   <a:outerShdw dist="35921" dir="2700000" algn="ctr" rotWithShape="0">
                     <a:schemeClr val="bg2"/>
@@ -5611,7 +5597,7 @@
           <a:noFill/>
           <a:extLst>
             <a:ext uri="{909E8E84-426E-40dd-AFC4-6F175D3DCCD1}">
-              <a14:hiddenFill xmlns:a14="http://schemas.microsoft.com/office/drawing/2010/main" xmlns="">
+              <a14:hiddenFill xmlns="" xmlns:a14="http://schemas.microsoft.com/office/drawing/2010/main">
                 <a:solidFill>
                   <a:srgbClr val="FFFFFF"/>
                 </a:solidFill>
@@ -5650,7 +5636,7 @@
           <a:noFill/>
           <a:extLst>
             <a:ext uri="{909E8E84-426E-40dd-AFC4-6F175D3DCCD1}">
-              <a14:hiddenFill xmlns:a14="http://schemas.microsoft.com/office/drawing/2010/main" xmlns="">
+              <a14:hiddenFill xmlns="" xmlns:a14="http://schemas.microsoft.com/office/drawing/2010/main">
                 <a:solidFill>
                   <a:srgbClr val="FFFFFF"/>
                 </a:solidFill>
@@ -5872,7 +5858,7 @@
           <a:noFill/>
           <a:extLst>
             <a:ext uri="{909E8E84-426E-40dd-AFC4-6F175D3DCCD1}">
-              <a14:hiddenFill xmlns:a14="http://schemas.microsoft.com/office/drawing/2010/main" xmlns="">
+              <a14:hiddenFill xmlns="" xmlns:a14="http://schemas.microsoft.com/office/drawing/2010/main">
                 <a:solidFill>
                   <a:srgbClr val="FFFFFF"/>
                 </a:solidFill>
@@ -5919,7 +5905,7 @@
           <a:noFill/>
           <a:extLst>
             <a:ext uri="{909E8E84-426E-40dd-AFC4-6F175D3DCCD1}">
-              <a14:hiddenFill xmlns:a14="http://schemas.microsoft.com/office/drawing/2010/main" xmlns="">
+              <a14:hiddenFill xmlns="" xmlns:a14="http://schemas.microsoft.com/office/drawing/2010/main">
                 <a:solidFill>
                   <a:srgbClr val="FFFFFF"/>
                 </a:solidFill>
@@ -5970,14 +5956,14 @@
           <a:effectLst/>
           <a:extLst>
             <a:ext uri="{909E8E84-426E-40dd-AFC4-6F175D3DCCD1}">
-              <a14:hiddenFill xmlns:a14="http://schemas.microsoft.com/office/drawing/2010/main" xmlns="">
+              <a14:hiddenFill xmlns="" xmlns:a14="http://schemas.microsoft.com/office/drawing/2010/main">
                 <a:solidFill>
                   <a:schemeClr val="accent1"/>
                 </a:solidFill>
               </a14:hiddenFill>
             </a:ext>
             <a:ext uri="{91240B29-F687-4f45-9708-019B960494DF}">
-              <a14:hiddenLine xmlns:a14="http://schemas.microsoft.com/office/drawing/2010/main" xmlns="" w="9525">
+              <a14:hiddenLine xmlns="" xmlns:a14="http://schemas.microsoft.com/office/drawing/2010/main" w="9525">
                 <a:solidFill>
                   <a:schemeClr val="tx1"/>
                 </a:solidFill>
@@ -5987,7 +5973,7 @@
               </a14:hiddenLine>
             </a:ext>
             <a:ext uri="{AF507438-7753-43e0-B8FC-AC1667EBCBE1}">
-              <a14:hiddenEffects xmlns:a14="http://schemas.microsoft.com/office/drawing/2010/main" xmlns="">
+              <a14:hiddenEffects xmlns="" xmlns:a14="http://schemas.microsoft.com/office/drawing/2010/main">
                 <a:effectLst>
                   <a:outerShdw dist="35921" dir="2700000" algn="ctr" rotWithShape="0">
                     <a:schemeClr val="bg2"/>
@@ -6040,14 +6026,14 @@
           <a:effectLst/>
           <a:extLst>
             <a:ext uri="{909E8E84-426E-40dd-AFC4-6F175D3DCCD1}">
-              <a14:hiddenFill xmlns:a14="http://schemas.microsoft.com/office/drawing/2010/main" xmlns="">
+              <a14:hiddenFill xmlns="" xmlns:a14="http://schemas.microsoft.com/office/drawing/2010/main">
                 <a:solidFill>
                   <a:schemeClr val="accent1"/>
                 </a:solidFill>
               </a14:hiddenFill>
             </a:ext>
             <a:ext uri="{91240B29-F687-4f45-9708-019B960494DF}">
-              <a14:hiddenLine xmlns:a14="http://schemas.microsoft.com/office/drawing/2010/main" xmlns="" w="9525">
+              <a14:hiddenLine xmlns="" xmlns:a14="http://schemas.microsoft.com/office/drawing/2010/main" w="9525">
                 <a:solidFill>
                   <a:schemeClr val="tx1"/>
                 </a:solidFill>
@@ -6057,7 +6043,7 @@
               </a14:hiddenLine>
             </a:ext>
             <a:ext uri="{AF507438-7753-43e0-B8FC-AC1667EBCBE1}">
-              <a14:hiddenEffects xmlns:a14="http://schemas.microsoft.com/office/drawing/2010/main" xmlns="">
+              <a14:hiddenEffects xmlns="" xmlns:a14="http://schemas.microsoft.com/office/drawing/2010/main">
                 <a:effectLst>
                   <a:outerShdw dist="35921" dir="2700000" algn="ctr" rotWithShape="0">
                     <a:schemeClr val="bg2"/>
@@ -6238,7 +6224,7 @@
           <a:p>
             <a:fld id="{0AA04CA3-5332-DE41-B91E-87FB1961F588}" type="datetime1">
               <a:rPr lang="en-US" smtClean="0"/>
-              <a:t>2/1/22</a:t>
+              <a:t>2/8/22</a:t>
             </a:fld>
             <a:endParaRPr lang="en-US"/>
           </a:p>
@@ -6500,7 +6486,7 @@
           <a:p>
             <a:fld id="{8884B688-DAA2-EC4A-8FCF-B0247FFD2F98}" type="datetime1">
               <a:rPr lang="en-US" smtClean="0"/>
-              <a:t>2/1/22</a:t>
+              <a:t>2/8/22</a:t>
             </a:fld>
             <a:endParaRPr lang="en-US"/>
           </a:p>
@@ -6809,7 +6795,7 @@
           <a:p>
             <a:fld id="{EB5DD5F2-345A-C74F-918D-6FF481781091}" type="datetime1">
               <a:rPr lang="en-US" smtClean="0"/>
-              <a:t>2/1/22</a:t>
+              <a:t>2/8/22</a:t>
             </a:fld>
             <a:endParaRPr lang="en-US"/>
           </a:p>
@@ -7263,7 +7249,7 @@
           <a:p>
             <a:fld id="{31917C5A-7C0D-E340-B2BB-02A59EEB267F}" type="datetime1">
               <a:rPr lang="en-US" smtClean="0"/>
-              <a:t>2/1/22</a:t>
+              <a:t>2/8/22</a:t>
             </a:fld>
             <a:endParaRPr lang="en-US"/>
           </a:p>
@@ -7402,7 +7388,7 @@
           <a:p>
             <a:fld id="{AE6552AD-FDDE-614C-9DFD-274349BF45AF}" type="datetime1">
               <a:rPr lang="en-US" smtClean="0"/>
-              <a:t>2/1/22</a:t>
+              <a:t>2/8/22</a:t>
             </a:fld>
             <a:endParaRPr lang="en-US"/>
           </a:p>
@@ -7513,7 +7499,7 @@
           <a:p>
             <a:fld id="{FBBA2767-B7F1-FE4B-8FC3-8B5AE6073D55}" type="datetime1">
               <a:rPr lang="en-US" smtClean="0"/>
-              <a:t>2/1/22</a:t>
+              <a:t>2/8/22</a:t>
             </a:fld>
             <a:endParaRPr lang="en-US"/>
           </a:p>
@@ -7867,7 +7853,7 @@
           <a:p>
             <a:fld id="{FF79C5F9-A6FE-DD49-8E9C-7E9EF5EC3160}" type="datetime1">
               <a:rPr lang="en-US" smtClean="0"/>
-              <a:t>2/1/22</a:t>
+              <a:t>2/8/22</a:t>
             </a:fld>
             <a:endParaRPr lang="en-US"/>
           </a:p>
@@ -8393,9 +8379,7 @@
           <p:cNvGraphicFramePr>
             <a:graphicFrameLocks/>
           </p:cNvGraphicFramePr>
-          <p:nvPr>
-            <p:extLst/>
-          </p:nvPr>
+          <p:nvPr/>
         </p:nvGraphicFramePr>
         <p:xfrm>
           <a:off x="2698336" y="3582075"/>
@@ -8986,9 +8970,7 @@
           <p:cNvGraphicFramePr>
             <a:graphicFrameLocks/>
           </p:cNvGraphicFramePr>
-          <p:nvPr>
-            <p:extLst/>
-          </p:nvPr>
+          <p:nvPr/>
         </p:nvGraphicFramePr>
         <p:xfrm>
           <a:off x="1893414" y="5506958"/>
@@ -11031,9 +11013,7 @@
           <p:cNvGraphicFramePr>
             <a:graphicFrameLocks/>
           </p:cNvGraphicFramePr>
-          <p:nvPr>
-            <p:extLst/>
-          </p:nvPr>
+          <p:nvPr/>
         </p:nvGraphicFramePr>
         <p:xfrm>
           <a:off x="1032530" y="4299926"/>
@@ -11585,9 +11565,7 @@
           <p:cNvGraphicFramePr>
             <a:graphicFrameLocks/>
           </p:cNvGraphicFramePr>
-          <p:nvPr>
-            <p:extLst/>
-          </p:nvPr>
+          <p:nvPr/>
         </p:nvGraphicFramePr>
         <p:xfrm>
           <a:off x="2314061" y="4299926"/>
@@ -12210,9 +12188,7 @@
           <p:cNvGraphicFramePr>
             <a:graphicFrameLocks/>
           </p:cNvGraphicFramePr>
-          <p:nvPr>
-            <p:extLst/>
-          </p:nvPr>
+          <p:nvPr/>
         </p:nvGraphicFramePr>
         <p:xfrm>
           <a:off x="3642070" y="4299925"/>
@@ -18328,7 +18304,6 @@
           </p:cNvGraphicFramePr>
           <p:nvPr>
             <p:ph idx="1"/>
-            <p:extLst/>
           </p:nvPr>
         </p:nvGraphicFramePr>
         <p:xfrm>
@@ -19212,9 +19187,7 @@
           <p:cNvGraphicFramePr>
             <a:graphicFrameLocks/>
           </p:cNvGraphicFramePr>
-          <p:nvPr>
-            <p:extLst/>
-          </p:nvPr>
+          <p:nvPr/>
         </p:nvGraphicFramePr>
         <p:xfrm>
           <a:off x="5005243" y="2748912"/>
@@ -24879,7 +24852,7 @@
             </a:r>
             <a:r>
               <a:rPr lang="en-GB" sz="1800" dirty="0"/>
-              <a:t>in the second matrix</a:t>
+              <a:t>in the second matrix.</a:t>
             </a:r>
           </a:p>
         </p:txBody>
@@ -24896,9 +24869,7 @@
           <p:cNvGraphicFramePr>
             <a:graphicFrameLocks/>
           </p:cNvGraphicFramePr>
-          <p:nvPr>
-            <p:extLst/>
-          </p:nvPr>
+          <p:nvPr/>
         </p:nvGraphicFramePr>
         <p:xfrm>
           <a:off x="2795649" y="2596865"/>
@@ -25562,9 +25533,7 @@
           <p:cNvGraphicFramePr>
             <a:graphicFrameLocks/>
           </p:cNvGraphicFramePr>
-          <p:nvPr>
-            <p:extLst/>
-          </p:nvPr>
+          <p:nvPr/>
         </p:nvGraphicFramePr>
         <p:xfrm>
           <a:off x="4623532" y="2803439"/>
@@ -26091,9 +26060,7 @@
           <p:cNvGraphicFramePr>
             <a:graphicFrameLocks/>
           </p:cNvGraphicFramePr>
-          <p:nvPr>
-            <p:extLst/>
-          </p:nvPr>
+          <p:nvPr/>
         </p:nvGraphicFramePr>
         <p:xfrm>
           <a:off x="716665" y="2847586"/>

</xml_diff>